<commit_message>
remove unsupported fa from UG
</commit_message>
<xml_diff>
--- a/docs/diagrams/ModuleInfoClassDiagram.pptx
+++ b/docs/diagrams/ModuleInfoClassDiagram.pptx
@@ -3365,7 +3365,7 @@
         </p:nvSpPr>
         <p:spPr>
           <a:xfrm flipV="1">
-            <a:off x="1524000" y="5257799"/>
+            <a:off x="2054086" y="6202679"/>
             <a:ext cx="9144000" cy="45719"/>
           </a:xfrm>
         </p:spPr>
@@ -3763,7 +3763,7 @@
         <p:spPr>
           <a:xfrm>
             <a:off x="4709784" y="1743540"/>
-            <a:ext cx="819455" cy="246221"/>
+            <a:ext cx="497252" cy="246221"/>
           </a:xfrm>
           <a:prstGeom prst="rect">
             <a:avLst/>
@@ -3778,7 +3778,7 @@
           <a:p>
             <a:r>
               <a:rPr lang="en-MY" sz="1000" dirty="0"/>
-              <a:t>prerequisite</a:t>
+              <a:t>needs</a:t>
             </a:r>
           </a:p>
         </p:txBody>
@@ -3982,7 +3982,7 @@
         <p:spPr>
           <a:xfrm>
             <a:off x="4705196" y="3577922"/>
-            <a:ext cx="777777" cy="261610"/>
+            <a:ext cx="742511" cy="261610"/>
           </a:xfrm>
           <a:prstGeom prst="rect">
             <a:avLst/>
@@ -3997,7 +3997,7 @@
           <a:p>
             <a:r>
               <a:rPr lang="en-MY" sz="1100" dirty="0"/>
-              <a:t>preclusion</a:t>
+              <a:t>precludes</a:t>
             </a:r>
           </a:p>
         </p:txBody>

</xml_diff>